<commit_message>
Fix typo presentation draft
Fix typo presentation draft
</commit_message>
<xml_diff>
--- a/output/presentation/Project_presentation_v2.pptx
+++ b/output/presentation/Project_presentation_v2.pptx
@@ -137,7 +137,7 @@
   <pc:docChgLst>
     <pc:chgData name="Hugo Perdomo" userId="0589d851aa69abb1" providerId="LiveId" clId="{2ED746A6-FDEE-B246-8A76-D182F5DF8FCA}"/>
     <pc:docChg chg="undo custSel addSld delSld modSld sldOrd">
-      <pc:chgData name="Hugo Perdomo" userId="0589d851aa69abb1" providerId="LiveId" clId="{2ED746A6-FDEE-B246-8A76-D182F5DF8FCA}" dt="2023-03-24T15:56:56.146" v="1666" actId="2696"/>
+      <pc:chgData name="Hugo Perdomo" userId="0589d851aa69abb1" providerId="LiveId" clId="{2ED746A6-FDEE-B246-8A76-D182F5DF8FCA}" dt="2023-03-24T15:58:01.693" v="1669" actId="20577"/>
       <pc:docMkLst>
         <pc:docMk/>
       </pc:docMkLst>
@@ -432,7 +432,7 @@
         </pc:spChg>
       </pc:sldChg>
       <pc:sldChg chg="addSp delSp modSp add mod setBg">
-        <pc:chgData name="Hugo Perdomo" userId="0589d851aa69abb1" providerId="LiveId" clId="{2ED746A6-FDEE-B246-8A76-D182F5DF8FCA}" dt="2023-03-24T15:55:41.603" v="1632" actId="12385"/>
+        <pc:chgData name="Hugo Perdomo" userId="0589d851aa69abb1" providerId="LiveId" clId="{2ED746A6-FDEE-B246-8A76-D182F5DF8FCA}" dt="2023-03-24T15:58:01.693" v="1669" actId="20577"/>
         <pc:sldMkLst>
           <pc:docMk/>
           <pc:sldMk cId="3787429484" sldId="269"/>
@@ -518,7 +518,7 @@
           </ac:graphicFrameMkLst>
         </pc:graphicFrameChg>
         <pc:graphicFrameChg chg="add mod modGraphic">
-          <ac:chgData name="Hugo Perdomo" userId="0589d851aa69abb1" providerId="LiveId" clId="{2ED746A6-FDEE-B246-8A76-D182F5DF8FCA}" dt="2023-03-24T15:55:41.603" v="1632" actId="12385"/>
+          <ac:chgData name="Hugo Perdomo" userId="0589d851aa69abb1" providerId="LiveId" clId="{2ED746A6-FDEE-B246-8A76-D182F5DF8FCA}" dt="2023-03-24T15:58:01.693" v="1669" actId="20577"/>
           <ac:graphicFrameMkLst>
             <pc:docMk/>
             <pc:sldMk cId="3787429484" sldId="269"/>
@@ -12132,7 +12132,7 @@
           <p:nvPr>
             <p:extLst>
               <p:ext uri="{D42A27DB-BD31-4B8C-83A1-F6EECF244321}">
-                <p14:modId xmlns:p14="http://schemas.microsoft.com/office/powerpoint/2010/main" val="1413216195"/>
+                <p14:modId xmlns:p14="http://schemas.microsoft.com/office/powerpoint/2010/main" val="835261312"/>
               </p:ext>
             </p:extLst>
           </p:nvPr>
@@ -12683,7 +12683,7 @@
                         <a:rPr lang="en-CA" sz="1200" u="none" strike="noStrike" dirty="0" err="1">
                           <a:effectLst/>
                         </a:rPr>
-                        <a:t>Xboost</a:t>
+                        <a:t>XGBoost</a:t>
                       </a:r>
                       <a:r>
                         <a:rPr lang="en-CA" sz="1200" u="none" strike="noStrike" dirty="0">

</xml_diff>